<commit_message>
Images for Lecture 4 and 5 added
</commit_message>
<xml_diff>
--- a/Handouts/Lecture 03.pptx
+++ b/Handouts/Lecture 03.pptx
@@ -253,7 +253,7 @@
             <a:fld id="{566E7F20-A29F-4C2A-9ED5-1CAD82BC0F93}" type="datetimeFigureOut">
               <a:rPr lang="en-US" smtClean="0"/>
               <a:pPr/>
-              <a:t>5/9/2022</a:t>
+              <a:t>5/10/2022</a:t>
             </a:fld>
             <a:endParaRPr lang="en-US"/>
           </a:p>
@@ -421,7 +421,7 @@
             <a:fld id="{E77891BB-24A3-4B1B-998B-3ED10EA61CB6}" type="datetimeFigureOut">
               <a:rPr lang="en-US" smtClean="0"/>
               <a:pPr/>
-              <a:t>5/9/2022</a:t>
+              <a:t>5/10/2022</a:t>
             </a:fld>
             <a:endParaRPr lang="en-US"/>
           </a:p>
@@ -934,7 +934,7 @@
           <a:p>
             <a:fld id="{2F031481-8C60-4676-BFB6-B23966059F11}" type="datetime1">
               <a:rPr lang="en-US" smtClean="0"/>
-              <a:t>5/9/2022</a:t>
+              <a:t>5/10/2022</a:t>
             </a:fld>
             <a:endParaRPr lang="en-US"/>
           </a:p>
@@ -1105,7 +1105,7 @@
           <a:p>
             <a:fld id="{D4364CD2-F53A-4464-9CEA-5D48B00C49C8}" type="datetime1">
               <a:rPr lang="en-US" smtClean="0"/>
-              <a:t>5/9/2022</a:t>
+              <a:t>5/10/2022</a:t>
             </a:fld>
             <a:endParaRPr lang="en-US"/>
           </a:p>
@@ -1286,7 +1286,7 @@
           <a:p>
             <a:fld id="{7D3A5C69-BE33-47E4-A662-F9554770F7DD}" type="datetime1">
               <a:rPr lang="en-US" smtClean="0"/>
-              <a:t>5/9/2022</a:t>
+              <a:t>5/10/2022</a:t>
             </a:fld>
             <a:endParaRPr lang="en-US"/>
           </a:p>
@@ -1457,7 +1457,7 @@
           <a:p>
             <a:fld id="{9A3AFF23-F07F-49AC-AAC7-4CCADDAE6366}" type="datetime1">
               <a:rPr lang="en-US" smtClean="0"/>
-              <a:t>5/9/2022</a:t>
+              <a:t>5/10/2022</a:t>
             </a:fld>
             <a:endParaRPr lang="en-US"/>
           </a:p>
@@ -1704,7 +1704,7 @@
           <a:p>
             <a:fld id="{788AA9FE-0FC2-4F34-9345-4414DCDC0914}" type="datetime1">
               <a:rPr lang="en-US" smtClean="0"/>
-              <a:t>5/9/2022</a:t>
+              <a:t>5/10/2022</a:t>
             </a:fld>
             <a:endParaRPr lang="en-US"/>
           </a:p>
@@ -1993,7 +1993,7 @@
           <a:p>
             <a:fld id="{1C1DCDC7-6ED4-483F-B9D8-F6A5061A9863}" type="datetime1">
               <a:rPr lang="en-US" smtClean="0"/>
-              <a:t>5/9/2022</a:t>
+              <a:t>5/10/2022</a:t>
             </a:fld>
             <a:endParaRPr lang="en-US"/>
           </a:p>
@@ -2416,7 +2416,7 @@
           <a:p>
             <a:fld id="{9B595092-9C7B-4815-86B4-AB62F6264E57}" type="datetime1">
               <a:rPr lang="en-US" smtClean="0"/>
-              <a:t>5/9/2022</a:t>
+              <a:t>5/10/2022</a:t>
             </a:fld>
             <a:endParaRPr lang="en-US"/>
           </a:p>
@@ -2535,7 +2535,7 @@
           <a:p>
             <a:fld id="{341EF18E-DCA4-4CE5-9D6F-C32ADDDEC335}" type="datetime1">
               <a:rPr lang="en-US" smtClean="0"/>
-              <a:t>5/9/2022</a:t>
+              <a:t>5/10/2022</a:t>
             </a:fld>
             <a:endParaRPr lang="en-US"/>
           </a:p>
@@ -2631,7 +2631,7 @@
           <a:p>
             <a:fld id="{5F52282A-8C9C-4459-9DBC-17E1B3598444}" type="datetime1">
               <a:rPr lang="en-US" smtClean="0"/>
-              <a:t>5/9/2022</a:t>
+              <a:t>5/10/2022</a:t>
             </a:fld>
             <a:endParaRPr lang="en-US"/>
           </a:p>
@@ -2909,7 +2909,7 @@
           <a:p>
             <a:fld id="{149306F4-04DC-4043-9B95-7DED79F09F2F}" type="datetime1">
               <a:rPr lang="en-US" smtClean="0"/>
-              <a:t>5/9/2022</a:t>
+              <a:t>5/10/2022</a:t>
             </a:fld>
             <a:endParaRPr lang="en-US"/>
           </a:p>
@@ -3163,7 +3163,7 @@
           <a:p>
             <a:fld id="{71ABE74A-8B9F-4BE3-9C7E-17AA9243B237}" type="datetime1">
               <a:rPr lang="en-US" smtClean="0"/>
-              <a:t>5/9/2022</a:t>
+              <a:t>5/10/2022</a:t>
             </a:fld>
             <a:endParaRPr lang="en-US"/>
           </a:p>
@@ -3377,7 +3377,7 @@
           <a:p>
             <a:fld id="{450F7620-9AAA-4928-93D3-A6CCCB2201A0}" type="datetime1">
               <a:rPr lang="en-US" smtClean="0"/>
-              <a:t>5/9/2022</a:t>
+              <a:t>5/10/2022</a:t>
             </a:fld>
             <a:endParaRPr lang="en-US"/>
           </a:p>

</xml_diff>